<commit_message>
plot node ages with legend and matching colors with source chronograms
</commit_message>
<xml_diff>
--- a/figures/figure2/source_chronograms.pptx
+++ b/figures/figure2/source_chronograms.pptx
@@ -2987,10 +2987,9 @@
             <a:avLst/>
           </a:prstGeom>
           <a:solidFill>
-            <a:schemeClr val="accent2">
-              <a:lumMod val="40000"/>
-              <a:lumOff val="60000"/>
-            </a:schemeClr>
+            <a:srgbClr val="7A0403">
+              <a:alpha val="70980"/>
+            </a:srgbClr>
           </a:solidFill>
         </p:spPr>
         <p:style>
@@ -3039,10 +3038,9 @@
             <a:avLst/>
           </a:prstGeom>
           <a:solidFill>
-            <a:schemeClr val="accent6">
-              <a:lumMod val="40000"/>
-              <a:lumOff val="60000"/>
-            </a:schemeClr>
+            <a:srgbClr val="D23004">
+              <a:alpha val="69804"/>
+            </a:srgbClr>
           </a:solidFill>
         </p:spPr>
         <p:style>
@@ -3091,10 +3089,9 @@
             <a:avLst/>
           </a:prstGeom>
           <a:solidFill>
-            <a:schemeClr val="accent4">
-              <a:lumMod val="20000"/>
-              <a:lumOff val="80000"/>
-            </a:schemeClr>
+            <a:srgbClr val="FB8121">
+              <a:alpha val="69804"/>
+            </a:srgbClr>
           </a:solidFill>
         </p:spPr>
         <p:style>
@@ -3143,10 +3140,7 @@
             <a:avLst/>
           </a:prstGeom>
           <a:solidFill>
-            <a:schemeClr val="accent4">
-              <a:lumMod val="20000"/>
-              <a:lumOff val="80000"/>
-            </a:schemeClr>
+            <a:srgbClr val="EED13A"/>
           </a:solidFill>
         </p:spPr>
         <p:style>
@@ -3195,8 +3189,8 @@
             <a:avLst/>
           </a:prstGeom>
           <a:solidFill>
-            <a:srgbClr val="7030A0">
-              <a:alpha val="38039"/>
+            <a:srgbClr val="A2FD3B">
+              <a:alpha val="69804"/>
             </a:srgbClr>
           </a:solidFill>
         </p:spPr>
@@ -3246,8 +3240,8 @@
             <a:avLst/>
           </a:prstGeom>
           <a:solidFill>
-            <a:srgbClr val="7030A0">
-              <a:alpha val="38039"/>
+            <a:srgbClr val="31F298">
+              <a:alpha val="69804"/>
             </a:srgbClr>
           </a:solidFill>
         </p:spPr>
@@ -3297,7 +3291,7 @@
             <a:avLst/>
           </a:prstGeom>
           <a:solidFill>
-            <a:srgbClr val="FF85FF">
+            <a:srgbClr val="456CE3">
               <a:alpha val="69804"/>
             </a:srgbClr>
           </a:solidFill>
@@ -3348,7 +3342,7 @@
             <a:avLst/>
           </a:prstGeom>
           <a:solidFill>
-            <a:srgbClr val="FF85FF">
+            <a:srgbClr val="28BBEC">
               <a:alpha val="69804"/>
             </a:srgbClr>
           </a:solidFill>
@@ -3399,10 +3393,9 @@
             <a:avLst/>
           </a:prstGeom>
           <a:solidFill>
-            <a:schemeClr val="accent1">
-              <a:lumMod val="40000"/>
-              <a:lumOff val="60000"/>
-            </a:schemeClr>
+            <a:srgbClr val="30113B">
+              <a:alpha val="69804"/>
+            </a:srgbClr>
           </a:solidFill>
         </p:spPr>
         <p:style>
@@ -3750,7 +3743,7 @@
         </p:blipFill>
         <p:spPr>
           <a:xfrm>
-            <a:off x="17915" y="1382250"/>
+            <a:off x="17915" y="1393680"/>
             <a:ext cx="3072384" cy="537000"/>
           </a:xfrm>
           <a:prstGeom prst="rect">
@@ -3779,7 +3772,7 @@
         </p:blipFill>
         <p:spPr>
           <a:xfrm>
-            <a:off x="6505956" y="1429118"/>
+            <a:off x="6505956" y="1440548"/>
             <a:ext cx="3072384" cy="537000"/>
           </a:xfrm>
           <a:prstGeom prst="rect">
@@ -3897,6 +3890,42 @@
           <a:xfrm>
             <a:off x="3291025" y="3988890"/>
             <a:ext cx="3072384" cy="537000"/>
+          </a:xfrm>
+          <a:prstGeom prst="rect">
+            <a:avLst/>
+          </a:prstGeom>
+        </p:spPr>
+      </p:pic>
+      <p:pic>
+        <p:nvPicPr>
+          <p:cNvPr id="56" name="Graphic 55">
+            <a:extLst>
+              <a:ext uri="{FF2B5EF4-FFF2-40B4-BE49-F238E27FC236}">
+                <a16:creationId xmlns:a16="http://schemas.microsoft.com/office/drawing/2014/main" id="{28981D1B-E3B7-944B-91D9-F36AB50F1DE9}"/>
+              </a:ext>
+            </a:extLst>
+          </p:cNvPr>
+          <p:cNvPicPr>
+            <a:picLocks noChangeAspect="1"/>
+          </p:cNvPicPr>
+          <p:nvPr/>
+        </p:nvPicPr>
+        <p:blipFill>
+          <a:blip r:embed="rId11">
+            <a:extLst>
+              <a:ext uri="{96DAC541-7B7A-43D3-8B79-37D633B846F1}">
+                <asvg:svgBlip xmlns:asvg="http://schemas.microsoft.com/office/drawing/2016/SVG/main" r:embed="rId12"/>
+              </a:ext>
+            </a:extLst>
+          </a:blip>
+          <a:stretch>
+            <a:fillRect/>
+          </a:stretch>
+        </p:blipFill>
+        <p:spPr>
+          <a:xfrm>
+            <a:off x="9706611" y="-592240"/>
+            <a:ext cx="10419962" cy="7442830"/>
           </a:xfrm>
           <a:prstGeom prst="rect">
             <a:avLst/>

</xml_diff>